<commit_message>
amélioration du chapitre 4
</commit_message>
<xml_diff>
--- a/CH4. Simulation de l'effet Morton/figures/schema l'effet Morton.pptx
+++ b/CH4. Simulation de l'effet Morton/figures/schema l'effet Morton.pptx
@@ -244,7 +244,7 @@
           <a:p>
             <a:fld id="{44A0B83A-71DB-44A8-B4A0-1A07F9BCFC65}" type="datetimeFigureOut">
               <a:rPr lang="en-US" smtClean="0"/>
-              <a:t>12/22/2018</a:t>
+              <a:t>1/17/2019</a:t>
             </a:fld>
             <a:endParaRPr lang="en-US"/>
           </a:p>
@@ -414,7 +414,7 @@
           <a:p>
             <a:fld id="{44A0B83A-71DB-44A8-B4A0-1A07F9BCFC65}" type="datetimeFigureOut">
               <a:rPr lang="en-US" smtClean="0"/>
-              <a:t>12/22/2018</a:t>
+              <a:t>1/17/2019</a:t>
             </a:fld>
             <a:endParaRPr lang="en-US"/>
           </a:p>
@@ -594,7 +594,7 @@
           <a:p>
             <a:fld id="{44A0B83A-71DB-44A8-B4A0-1A07F9BCFC65}" type="datetimeFigureOut">
               <a:rPr lang="en-US" smtClean="0"/>
-              <a:t>12/22/2018</a:t>
+              <a:t>1/17/2019</a:t>
             </a:fld>
             <a:endParaRPr lang="en-US"/>
           </a:p>
@@ -764,7 +764,7 @@
           <a:p>
             <a:fld id="{44A0B83A-71DB-44A8-B4A0-1A07F9BCFC65}" type="datetimeFigureOut">
               <a:rPr lang="en-US" smtClean="0"/>
-              <a:t>12/22/2018</a:t>
+              <a:t>1/17/2019</a:t>
             </a:fld>
             <a:endParaRPr lang="en-US"/>
           </a:p>
@@ -1010,7 +1010,7 @@
           <a:p>
             <a:fld id="{44A0B83A-71DB-44A8-B4A0-1A07F9BCFC65}" type="datetimeFigureOut">
               <a:rPr lang="en-US" smtClean="0"/>
-              <a:t>12/22/2018</a:t>
+              <a:t>1/17/2019</a:t>
             </a:fld>
             <a:endParaRPr lang="en-US"/>
           </a:p>
@@ -1242,7 +1242,7 @@
           <a:p>
             <a:fld id="{44A0B83A-71DB-44A8-B4A0-1A07F9BCFC65}" type="datetimeFigureOut">
               <a:rPr lang="en-US" smtClean="0"/>
-              <a:t>12/22/2018</a:t>
+              <a:t>1/17/2019</a:t>
             </a:fld>
             <a:endParaRPr lang="en-US"/>
           </a:p>
@@ -1609,7 +1609,7 @@
           <a:p>
             <a:fld id="{44A0B83A-71DB-44A8-B4A0-1A07F9BCFC65}" type="datetimeFigureOut">
               <a:rPr lang="en-US" smtClean="0"/>
-              <a:t>12/22/2018</a:t>
+              <a:t>1/17/2019</a:t>
             </a:fld>
             <a:endParaRPr lang="en-US"/>
           </a:p>
@@ -1727,7 +1727,7 @@
           <a:p>
             <a:fld id="{44A0B83A-71DB-44A8-B4A0-1A07F9BCFC65}" type="datetimeFigureOut">
               <a:rPr lang="en-US" smtClean="0"/>
-              <a:t>12/22/2018</a:t>
+              <a:t>1/17/2019</a:t>
             </a:fld>
             <a:endParaRPr lang="en-US"/>
           </a:p>
@@ -1822,7 +1822,7 @@
           <a:p>
             <a:fld id="{44A0B83A-71DB-44A8-B4A0-1A07F9BCFC65}" type="datetimeFigureOut">
               <a:rPr lang="en-US" smtClean="0"/>
-              <a:t>12/22/2018</a:t>
+              <a:t>1/17/2019</a:t>
             </a:fld>
             <a:endParaRPr lang="en-US"/>
           </a:p>
@@ -2099,7 +2099,7 @@
           <a:p>
             <a:fld id="{44A0B83A-71DB-44A8-B4A0-1A07F9BCFC65}" type="datetimeFigureOut">
               <a:rPr lang="en-US" smtClean="0"/>
-              <a:t>12/22/2018</a:t>
+              <a:t>1/17/2019</a:t>
             </a:fld>
             <a:endParaRPr lang="en-US"/>
           </a:p>
@@ -2352,7 +2352,7 @@
           <a:p>
             <a:fld id="{44A0B83A-71DB-44A8-B4A0-1A07F9BCFC65}" type="datetimeFigureOut">
               <a:rPr lang="en-US" smtClean="0"/>
-              <a:t>12/22/2018</a:t>
+              <a:t>1/17/2019</a:t>
             </a:fld>
             <a:endParaRPr lang="en-US"/>
           </a:p>
@@ -2565,7 +2565,7 @@
           <a:p>
             <a:fld id="{44A0B83A-71DB-44A8-B4A0-1A07F9BCFC65}" type="datetimeFigureOut">
               <a:rPr lang="en-US" smtClean="0"/>
-              <a:t>12/22/2018</a:t>
+              <a:t>1/17/2019</a:t>
             </a:fld>
             <a:endParaRPr lang="en-US"/>
           </a:p>
@@ -3090,15 +3090,7 @@
                   <a:ea typeface="宋体" panose="02010600030101010101" pitchFamily="2" charset="-122"/>
                   <a:cs typeface="Times New Roman" panose="02020603050405020304" pitchFamily="18" charset="0"/>
                 </a:rPr>
-                <a:t>Mo</a:t>
-              </a:r>
-              <a:r>
-                <a:rPr lang="fr-FR" sz="1400" i="1" dirty="0" smtClean="0">
-                  <a:latin typeface="Calibri" panose="020F0502020204030204" pitchFamily="34" charset="0"/>
-                  <a:ea typeface="宋体" panose="02010600030101010101" pitchFamily="2" charset="-122"/>
-                  <a:cs typeface="Times New Roman" panose="02020603050405020304" pitchFamily="18" charset="0"/>
-                </a:rPr>
-                <a:t>dèle dynamique du système rotor-palier</a:t>
+                <a:t>Modèle dynamique du système rotor-palier</a:t>
               </a:r>
             </a:p>
             <a:p>
@@ -3183,7 +3175,7 @@
                 <p:spPr>
                   <a:xfrm>
                     <a:off x="2828581" y="1742692"/>
-                    <a:ext cx="2382372" cy="288592"/>
+                    <a:ext cx="2695920" cy="288592"/>
                   </a:xfrm>
                   <a:prstGeom prst="rect">
                     <a:avLst/>
@@ -3260,20 +3252,48 @@
                             </m:r>
                           </m:sup>
                         </m:sSubSup>
-                        <m:r>
-                          <a:rPr lang="fr-FR" sz="1400" i="1" kern="1200">
-                            <a:solidFill>
-                              <a:srgbClr val="000000"/>
-                            </a:solidFill>
-                            <a:effectLst/>
-                            <a:latin typeface="Cambria Math" panose="02040503050406030204" pitchFamily="18" charset="0"/>
-                            <a:ea typeface="宋体" panose="02010600030101010101" pitchFamily="2" charset="-122"/>
-                            <a:cs typeface="Times New Roman" panose="02020603050405020304" pitchFamily="18" charset="0"/>
-                          </a:rPr>
-                          <m:t> </m:t>
-                        </m:r>
+                        <m:d>
+                          <m:dPr>
+                            <m:ctrlPr>
+                              <a:rPr lang="fr-FR" sz="1400" i="1"/>
+                            </m:ctrlPr>
+                          </m:dPr>
+                          <m:e>
+                            <m:sSub>
+                              <m:sSubPr>
+                                <m:ctrlPr>
+                                  <a:rPr lang="fr-FR" sz="1400" i="1"/>
+                                </m:ctrlPr>
+                              </m:sSubPr>
+                              <m:e>
+                                <m:r>
+                                  <a:rPr lang="fr-FR" sz="1400" i="1"/>
+                                  <m:t>𝜃</m:t>
+                                </m:r>
+                              </m:e>
+                              <m:sub>
+                                <m:r>
+                                  <a:rPr lang="fr-FR" sz="1400" i="1"/>
+                                  <m:t>𝑟</m:t>
+                                </m:r>
+                              </m:sub>
+                            </m:sSub>
+                          </m:e>
+                        </m:d>
                       </m:oMath>
                     </a14:m>
+                    <a:r>
+                      <a:rPr lang="fr-FR" sz="1400" i="0" kern="1200" dirty="0" smtClean="0">
+                        <a:solidFill>
+                          <a:srgbClr val="000000"/>
+                        </a:solidFill>
+                        <a:effectLst/>
+                        <a:latin typeface="+mj-lt"/>
+                        <a:ea typeface="宋体" panose="02010600030101010101" pitchFamily="2" charset="-122"/>
+                        <a:cs typeface="Times New Roman" panose="02020603050405020304" pitchFamily="18" charset="0"/>
+                      </a:rPr>
+                      <a:t> </a:t>
+                    </a:r>
                     <a:r>
                       <a:rPr lang="fr-FR" sz="1400" i="0" kern="1200" dirty="0" smtClean="0">
                         <a:solidFill>
@@ -3392,12 +3412,12 @@
                 <p:spPr>
                   <a:xfrm>
                     <a:off x="2828581" y="1742692"/>
-                    <a:ext cx="2382372" cy="288592"/>
+                    <a:ext cx="2695920" cy="288592"/>
                   </a:xfrm>
                   <a:prstGeom prst="rect">
                     <a:avLst/>
                   </a:prstGeom>
-                  <a:blipFill>
+                  <a:blipFill rotWithShape="0">
                     <a:blip r:embed="rId2"/>
                     <a:stretch>
                       <a:fillRect b="-34043"/>
@@ -3409,7 +3429,7 @@
                   <a:lstStyle/>
                   <a:p>
                     <a:r>
-                      <a:rPr lang="en-US">
+                      <a:rPr lang="fr-FR">
                         <a:noFill/>
                       </a:rPr>
                       <a:t> </a:t>
@@ -3429,8 +3449,8 @@
                 </p:nvSpPr>
                 <p:spPr>
                   <a:xfrm>
-                    <a:off x="3140742" y="2115288"/>
-                    <a:ext cx="1861343" cy="336631"/>
+                    <a:off x="3000800" y="2115288"/>
+                    <a:ext cx="2141227" cy="336631"/>
                   </a:xfrm>
                   <a:prstGeom prst="rect">
                     <a:avLst/>
@@ -3482,13 +3502,34 @@
                             </m:r>
                           </m:sup>
                         </m:sSubSup>
-                        <m:r>
-                          <a:rPr lang="fr-FR" sz="1400" b="1" i="1" smtClean="0">
-                            <a:latin typeface="Cambria Math" panose="02040503050406030204" pitchFamily="18" charset="0"/>
-                            <a:ea typeface="Cambria Math" panose="02040503050406030204" pitchFamily="18" charset="0"/>
-                          </a:rPr>
-                          <m:t> </m:t>
-                        </m:r>
+                        <m:d>
+                          <m:dPr>
+                            <m:ctrlPr>
+                              <a:rPr lang="fr-FR" sz="1400" i="1"/>
+                            </m:ctrlPr>
+                          </m:dPr>
+                          <m:e>
+                            <m:sSub>
+                              <m:sSubPr>
+                                <m:ctrlPr>
+                                  <a:rPr lang="fr-FR" sz="1400" i="1"/>
+                                </m:ctrlPr>
+                              </m:sSubPr>
+                              <m:e>
+                                <m:r>
+                                  <a:rPr lang="fr-FR" sz="1400" i="1"/>
+                                  <m:t>𝜃</m:t>
+                                </m:r>
+                              </m:e>
+                              <m:sub>
+                                <m:r>
+                                  <a:rPr lang="fr-FR" sz="1400" i="1"/>
+                                  <m:t>𝑟</m:t>
+                                </m:r>
+                              </m:sub>
+                            </m:sSub>
+                          </m:e>
+                        </m:d>
                       </m:oMath>
                     </a14:m>
                     <a:r>
@@ -3511,16 +3552,16 @@
                 </p:nvSpPr>
                 <p:spPr>
                   <a:xfrm>
-                    <a:off x="3140742" y="2115288"/>
-                    <a:ext cx="1861343" cy="336631"/>
+                    <a:off x="3000800" y="2115288"/>
+                    <a:ext cx="2141227" cy="336631"/>
                   </a:xfrm>
                   <a:prstGeom prst="rect">
                     <a:avLst/>
                   </a:prstGeom>
-                  <a:blipFill>
+                  <a:blipFill rotWithShape="0">
                     <a:blip r:embed="rId3"/>
                     <a:stretch>
-                      <a:fillRect r="-328" b="-14545"/>
+                      <a:fillRect r="-285" b="-14545"/>
                     </a:stretch>
                   </a:blipFill>
                 </p:spPr>
@@ -3529,7 +3570,7 @@
                   <a:lstStyle/>
                   <a:p>
                     <a:r>
-                      <a:rPr lang="en-US">
+                      <a:rPr lang="fr-FR">
                         <a:noFill/>
                       </a:rPr>
                       <a:t> </a:t>
@@ -3548,10 +3589,10 @@
           </p:nvGrpSpPr>
           <p:grpSpPr>
             <a:xfrm>
-              <a:off x="3213151" y="4001375"/>
-              <a:ext cx="2863800" cy="665497"/>
-              <a:chOff x="2660701" y="3639425"/>
-              <a:chExt cx="2863800" cy="665497"/>
+              <a:off x="3213151" y="3997427"/>
+              <a:ext cx="2863800" cy="669445"/>
+              <a:chOff x="2660701" y="3635477"/>
+              <a:chExt cx="2863800" cy="669445"/>
             </a:xfrm>
           </p:grpSpPr>
           <p:cxnSp>
@@ -3598,8 +3639,8 @@
                 </p:nvSpPr>
                 <p:spPr>
                   <a:xfrm>
-                    <a:off x="2838451" y="3639425"/>
-                    <a:ext cx="2428778" cy="288592"/>
+                    <a:off x="2801512" y="3635477"/>
+                    <a:ext cx="2706526" cy="288592"/>
                   </a:xfrm>
                   <a:prstGeom prst="rect">
                     <a:avLst/>
@@ -3688,18 +3729,34 @@
                             </m:r>
                           </m:sup>
                         </m:sSubSup>
-                        <m:r>
-                          <a:rPr lang="fr-FR" sz="1400" i="1" kern="1200">
-                            <a:solidFill>
-                              <a:srgbClr val="000000"/>
-                            </a:solidFill>
-                            <a:effectLst/>
-                            <a:latin typeface="Cambria Math" panose="02040503050406030204" pitchFamily="18" charset="0"/>
-                            <a:ea typeface="宋体" panose="02010600030101010101" pitchFamily="2" charset="-122"/>
-                            <a:cs typeface="Times New Roman" panose="02020603050405020304" pitchFamily="18" charset="0"/>
-                          </a:rPr>
-                          <m:t> </m:t>
-                        </m:r>
+                        <m:d>
+                          <m:dPr>
+                            <m:ctrlPr>
+                              <a:rPr lang="fr-FR" sz="1400" i="1"/>
+                            </m:ctrlPr>
+                          </m:dPr>
+                          <m:e>
+                            <m:sSub>
+                              <m:sSubPr>
+                                <m:ctrlPr>
+                                  <a:rPr lang="fr-FR" sz="1400" i="1"/>
+                                </m:ctrlPr>
+                              </m:sSubPr>
+                              <m:e>
+                                <m:r>
+                                  <a:rPr lang="fr-FR" sz="1400" i="1"/>
+                                  <m:t>𝜃</m:t>
+                                </m:r>
+                              </m:e>
+                              <m:sub>
+                                <m:r>
+                                  <a:rPr lang="fr-FR" sz="1400" i="1"/>
+                                  <m:t>𝑟</m:t>
+                                </m:r>
+                              </m:sub>
+                            </m:sSub>
+                          </m:e>
+                        </m:d>
                       </m:oMath>
                     </a14:m>
                     <a:r>
@@ -3831,16 +3888,16 @@
                 </p:nvSpPr>
                 <p:spPr>
                   <a:xfrm>
-                    <a:off x="2838451" y="3639425"/>
-                    <a:ext cx="2428778" cy="288592"/>
+                    <a:off x="2801512" y="3635477"/>
+                    <a:ext cx="2706526" cy="288592"/>
                   </a:xfrm>
                   <a:prstGeom prst="rect">
                     <a:avLst/>
                   </a:prstGeom>
-                  <a:blipFill>
+                  <a:blipFill rotWithShape="0">
                     <a:blip r:embed="rId4"/>
                     <a:stretch>
-                      <a:fillRect b="-34043"/>
+                      <a:fillRect r="-225" b="-33333"/>
                     </a:stretch>
                   </a:blipFill>
                 </p:spPr>
@@ -3849,7 +3906,7 @@
                   <a:lstStyle/>
                   <a:p>
                     <a:r>
-                      <a:rPr lang="en-US">
+                      <a:rPr lang="fr-FR">
                         <a:noFill/>
                       </a:rPr>
                       <a:t> </a:t>
@@ -3869,8 +3926,8 @@
                 </p:nvSpPr>
                 <p:spPr>
                   <a:xfrm>
-                    <a:off x="3273438" y="3968291"/>
-                    <a:ext cx="1861343" cy="336631"/>
+                    <a:off x="3133496" y="3968291"/>
+                    <a:ext cx="2141227" cy="336631"/>
                   </a:xfrm>
                   <a:prstGeom prst="rect">
                     <a:avLst/>
@@ -3929,13 +3986,34 @@
                             </m:r>
                           </m:sup>
                         </m:sSubSup>
-                        <m:r>
-                          <a:rPr lang="fr-FR" sz="1400" b="1" i="1" smtClean="0">
-                            <a:latin typeface="Cambria Math" panose="02040503050406030204" pitchFamily="18" charset="0"/>
-                            <a:ea typeface="Cambria Math" panose="02040503050406030204" pitchFamily="18" charset="0"/>
-                          </a:rPr>
-                          <m:t> </m:t>
-                        </m:r>
+                        <m:d>
+                          <m:dPr>
+                            <m:ctrlPr>
+                              <a:rPr lang="fr-FR" sz="1400" i="1"/>
+                            </m:ctrlPr>
+                          </m:dPr>
+                          <m:e>
+                            <m:sSub>
+                              <m:sSubPr>
+                                <m:ctrlPr>
+                                  <a:rPr lang="fr-FR" sz="1400" i="1"/>
+                                </m:ctrlPr>
+                              </m:sSubPr>
+                              <m:e>
+                                <m:r>
+                                  <a:rPr lang="fr-FR" sz="1400" i="1"/>
+                                  <m:t>𝜃</m:t>
+                                </m:r>
+                              </m:e>
+                              <m:sub>
+                                <m:r>
+                                  <a:rPr lang="fr-FR" sz="1400" i="1"/>
+                                  <m:t>𝑟</m:t>
+                                </m:r>
+                              </m:sub>
+                            </m:sSub>
+                          </m:e>
+                        </m:d>
                       </m:oMath>
                     </a14:m>
                     <a:r>
@@ -3958,16 +4036,16 @@
                 </p:nvSpPr>
                 <p:spPr>
                   <a:xfrm>
-                    <a:off x="3273438" y="3968291"/>
-                    <a:ext cx="1861343" cy="336631"/>
+                    <a:off x="3133496" y="3968291"/>
+                    <a:ext cx="2141227" cy="336631"/>
                   </a:xfrm>
                   <a:prstGeom prst="rect">
                     <a:avLst/>
                   </a:prstGeom>
-                  <a:blipFill>
+                  <a:blipFill rotWithShape="0">
                     <a:blip r:embed="rId5"/>
                     <a:stretch>
-                      <a:fillRect r="-328" b="-14545"/>
+                      <a:fillRect r="-285" b="-14545"/>
                     </a:stretch>
                   </a:blipFill>
                 </p:spPr>
@@ -3976,7 +4054,7 @@
                   <a:lstStyle/>
                   <a:p>
                     <a:r>
-                      <a:rPr lang="en-US">
+                      <a:rPr lang="fr-FR">
                         <a:noFill/>
                       </a:rPr>
                       <a:t> </a:t>
@@ -4009,10 +4087,10 @@
             </p:nvGrpSpPr>
             <p:grpSpPr>
               <a:xfrm>
-                <a:off x="6331655" y="2477238"/>
-                <a:ext cx="2896609" cy="1831383"/>
+                <a:off x="6331656" y="2477238"/>
+                <a:ext cx="3193345" cy="1832217"/>
                 <a:chOff x="6038460" y="2104637"/>
-                <a:chExt cx="2918242" cy="1831383"/>
+                <a:chExt cx="3217194" cy="1832217"/>
               </a:xfrm>
             </p:grpSpPr>
             <p:sp>
@@ -4060,7 +4138,7 @@
                   <p:spPr>
                     <a:xfrm>
                       <a:off x="6038460" y="3363427"/>
-                      <a:ext cx="2918242" cy="572593"/>
+                      <a:ext cx="3217194" cy="573427"/>
                     </a:xfrm>
                     <a:prstGeom prst="rect">
                       <a:avLst/>
@@ -4129,6 +4207,34 @@
                               </m:r>
                             </m:sub>
                           </m:sSub>
+                          <m:d>
+                            <m:dPr>
+                              <m:ctrlPr>
+                                <a:rPr lang="fr-FR" sz="1400" i="1"/>
+                              </m:ctrlPr>
+                            </m:dPr>
+                            <m:e>
+                              <m:sSub>
+                                <m:sSubPr>
+                                  <m:ctrlPr>
+                                    <a:rPr lang="fr-FR" sz="1400" i="1"/>
+                                  </m:ctrlPr>
+                                </m:sSubPr>
+                                <m:e>
+                                  <m:r>
+                                    <a:rPr lang="fr-FR" sz="1400" i="1"/>
+                                    <m:t>𝜃</m:t>
+                                  </m:r>
+                                </m:e>
+                                <m:sub>
+                                  <m:r>
+                                    <a:rPr lang="fr-FR" sz="1400" i="1"/>
+                                    <m:t>𝑟</m:t>
+                                  </m:r>
+                                </m:sub>
+                              </m:sSub>
+                            </m:e>
+                          </m:d>
                         </m:oMath>
                       </a14:m>
                       <a:endParaRPr lang="en-US" sz="1400" b="1" dirty="0"/>
@@ -4148,15 +4254,15 @@
                   <p:spPr>
                     <a:xfrm>
                       <a:off x="6038460" y="3363427"/>
-                      <a:ext cx="2918242" cy="572593"/>
+                      <a:ext cx="3217194" cy="573427"/>
                     </a:xfrm>
                     <a:prstGeom prst="rect">
                       <a:avLst/>
                     </a:prstGeom>
-                    <a:blipFill>
+                    <a:blipFill rotWithShape="0">
                       <a:blip r:embed="rId6"/>
                       <a:stretch>
-                        <a:fillRect l="-421" t="-1064" b="-7447"/>
+                        <a:fillRect l="-382" t="-1064" b="-7447"/>
                       </a:stretch>
                     </a:blipFill>
                   </p:spPr>
@@ -4165,7 +4271,7 @@
                     <a:lstStyle/>
                     <a:p>
                       <a:r>
-                        <a:rPr lang="en-US">
+                        <a:rPr lang="fr-FR">
                           <a:noFill/>
                         </a:rPr>
                         <a:t> </a:t>
@@ -4184,13 +4290,13 @@
               <p:grpSpPr>
                 <a:xfrm>
                   <a:off x="6038490" y="2104637"/>
-                  <a:ext cx="2756103" cy="307777"/>
+                  <a:ext cx="3090258" cy="307777"/>
                   <a:chOff x="5499400" y="1750786"/>
-                  <a:chExt cx="2756103" cy="307777"/>
+                  <a:chExt cx="3090258" cy="307777"/>
                 </a:xfrm>
               </p:grpSpPr>
-              <mc:AlternateContent xmlns:mc="http://schemas.openxmlformats.org/markup-compatibility/2006">
-                <mc:Choice xmlns:a14="http://schemas.microsoft.com/office/drawing/2010/main" Requires="a14">
+              <mc:AlternateContent xmlns:mc="http://schemas.openxmlformats.org/markup-compatibility/2006" xmlns:a14="http://schemas.microsoft.com/office/drawing/2010/main">
+                <mc:Choice Requires="a14">
                   <p:sp>
                     <p:nvSpPr>
                       <p:cNvPr id="46" name="ZoneTexte 45"/>
@@ -4283,7 +4389,7 @@
                     </p:txBody>
                   </p:sp>
                 </mc:Choice>
-                <mc:Fallback>
+                <mc:Fallback xmlns="">
                   <p:sp>
                     <p:nvSpPr>
                       <p:cNvPr id="46" name="ZoneTexte 45"/>
@@ -4333,7 +4439,7 @@
                     <p:spPr>
                       <a:xfrm>
                         <a:off x="6960325" y="1750786"/>
-                        <a:ext cx="1295178" cy="307777"/>
+                        <a:ext cx="1629333" cy="307777"/>
                       </a:xfrm>
                       <a:prstGeom prst="rect">
                         <a:avLst/>
@@ -4405,6 +4511,34 @@
                                 </m:r>
                               </m:sub>
                             </m:sSub>
+                            <m:d>
+                              <m:dPr>
+                                <m:ctrlPr>
+                                  <a:rPr lang="fr-FR" sz="1400" i="1"/>
+                                </m:ctrlPr>
+                              </m:dPr>
+                              <m:e>
+                                <m:sSub>
+                                  <m:sSubPr>
+                                    <m:ctrlPr>
+                                      <a:rPr lang="fr-FR" sz="1400" i="1"/>
+                                    </m:ctrlPr>
+                                  </m:sSubPr>
+                                  <m:e>
+                                    <m:r>
+                                      <a:rPr lang="fr-FR" sz="1400" i="1"/>
+                                      <m:t>𝜃</m:t>
+                                    </m:r>
+                                  </m:e>
+                                  <m:sub>
+                                    <m:r>
+                                      <a:rPr lang="fr-FR" sz="1400" i="1"/>
+                                      <m:t>𝑟</m:t>
+                                    </m:r>
+                                  </m:sub>
+                                </m:sSub>
+                              </m:e>
+                            </m:d>
                           </m:oMath>
                         </a14:m>
                         <a:r>
@@ -4428,15 +4562,15 @@
                     <p:spPr>
                       <a:xfrm>
                         <a:off x="6960325" y="1750786"/>
-                        <a:ext cx="1295178" cy="307777"/>
+                        <a:ext cx="1629333" cy="307777"/>
                       </a:xfrm>
                       <a:prstGeom prst="rect">
                         <a:avLst/>
                       </a:prstGeom>
-                      <a:blipFill>
+                      <a:blipFill rotWithShape="0">
                         <a:blip r:embed="rId8"/>
                         <a:stretch>
-                          <a:fillRect l="-943" t="-1923" b="-17308"/>
+                          <a:fillRect l="-749" t="-1923" b="-17308"/>
                         </a:stretch>
                       </a:blipFill>
                     </p:spPr>
@@ -4445,7 +4579,7 @@
                       <a:lstStyle/>
                       <a:p>
                         <a:r>
-                          <a:rPr lang="en-US">
+                          <a:rPr lang="fr-FR">
                             <a:noFill/>
                           </a:rPr>
                           <a:t> </a:t>
@@ -4467,7 +4601,7 @@
                 <p:spPr>
                   <a:xfrm flipH="1">
                     <a:off x="6492429" y="1904675"/>
-                    <a:ext cx="467896" cy="0"/>
+                    <a:ext cx="467895" cy="0"/>
                   </a:xfrm>
                   <a:prstGeom prst="straightConnector1">
                     <a:avLst/>
@@ -4596,8 +4730,8 @@
               </a:p>
             </p:txBody>
           </p:sp>
-          <mc:AlternateContent xmlns:mc="http://schemas.openxmlformats.org/markup-compatibility/2006">
-            <mc:Choice xmlns:a14="http://schemas.microsoft.com/office/drawing/2010/main" Requires="a14">
+          <mc:AlternateContent xmlns:mc="http://schemas.openxmlformats.org/markup-compatibility/2006" xmlns:a14="http://schemas.microsoft.com/office/drawing/2010/main">
+            <mc:Choice Requires="a14">
               <p:sp>
                 <p:nvSpPr>
                   <p:cNvPr id="100" name="ZoneTexte 105"/>
@@ -4698,7 +4832,7 @@
                 </p:txBody>
               </p:sp>
             </mc:Choice>
-            <mc:Fallback>
+            <mc:Fallback xmlns="">
               <p:sp>
                 <p:nvSpPr>
                   <p:cNvPr id="100" name="ZoneTexte 105"/>
@@ -4798,8 +4932,8 @@
               </a:p>
             </p:txBody>
           </p:sp>
-          <mc:AlternateContent xmlns:mc="http://schemas.openxmlformats.org/markup-compatibility/2006">
-            <mc:Choice xmlns:a14="http://schemas.microsoft.com/office/drawing/2010/main" Requires="a14">
+          <mc:AlternateContent xmlns:mc="http://schemas.openxmlformats.org/markup-compatibility/2006" xmlns:a14="http://schemas.microsoft.com/office/drawing/2010/main">
+            <mc:Choice Requires="a14">
               <p:sp>
                 <p:nvSpPr>
                   <p:cNvPr id="102" name="ZoneTexte 152"/>
@@ -4900,7 +5034,7 @@
                 </p:txBody>
               </p:sp>
             </mc:Choice>
-            <mc:Fallback>
+            <mc:Fallback xmlns="">
               <p:sp>
                 <p:nvSpPr>
                   <p:cNvPr id="102" name="ZoneTexte 152"/>
@@ -5356,23 +5490,21 @@
                           </m:oMathParaPr>
                           <m:oMath xmlns:m="http://schemas.openxmlformats.org/officeDocument/2006/math">
                             <m:r>
-                              <m:rPr>
-                                <m:sty m:val="p"/>
-                              </m:rPr>
-                              <a:rPr lang="fr-FR" sz="1600" b="0" i="0" kern="1200" smtClean="0">
+                              <a:rPr lang="fr-FR" sz="1600" b="0" i="1" kern="1200" smtClean="0">
                                 <a:solidFill>
                                   <a:srgbClr val="000000"/>
                                 </a:solidFill>
                                 <a:effectLst/>
+                                <a:latin typeface="Cambria Math" panose="02040503050406030204" pitchFamily="18" charset="0"/>
                                 <a:ea typeface="宋体" panose="02010600030101010101" pitchFamily="2" charset="-122"/>
                                 <a:cs typeface="Times New Roman" panose="02020603050405020304" pitchFamily="18" charset="0"/>
                               </a:rPr>
-                              <m:t>temp</m:t>
+                              <m:t>𝑡𝑒𝑚𝑝𝑠</m:t>
                             </m:r>
                           </m:oMath>
                         </m:oMathPara>
                       </a14:m>
-                      <a:endParaRPr lang="en-US" sz="1600" dirty="0">
+                      <a:endParaRPr lang="en-US" sz="1600" i="1" dirty="0">
                         <a:effectLst/>
                         <a:ea typeface="宋体" panose="02010600030101010101" pitchFamily="2" charset="-122"/>
                       </a:endParaRPr>
@@ -5397,7 +5529,7 @@
                     <a:prstGeom prst="rect">
                       <a:avLst/>
                     </a:prstGeom>
-                    <a:blipFill>
+                    <a:blipFill rotWithShape="0">
                       <a:blip r:embed="rId11"/>
                       <a:stretch>
                         <a:fillRect/>
@@ -5409,7 +5541,7 @@
                     <a:lstStyle/>
                     <a:p>
                       <a:r>
-                        <a:rPr lang="en-US">
+                        <a:rPr lang="fr-FR">
                           <a:noFill/>
                         </a:rPr>
                         <a:t> </a:t>
@@ -5420,8 +5552,8 @@
               </mc:Fallback>
             </mc:AlternateContent>
           </p:grpSp>
-          <mc:AlternateContent xmlns:mc="http://schemas.openxmlformats.org/markup-compatibility/2006">
-            <mc:Choice xmlns:a14="http://schemas.microsoft.com/office/drawing/2010/main" Requires="a14">
+          <mc:AlternateContent xmlns:mc="http://schemas.openxmlformats.org/markup-compatibility/2006" xmlns:a14="http://schemas.microsoft.com/office/drawing/2010/main">
+            <mc:Choice Requires="a14">
               <p:sp>
                 <p:nvSpPr>
                   <p:cNvPr id="105" name="Rectangle 104"/>
@@ -5509,7 +5641,7 @@
                 </p:txBody>
               </p:sp>
             </mc:Choice>
-            <mc:Fallback>
+            <mc:Fallback xmlns="">
               <p:sp>
                 <p:nvSpPr>
                   <p:cNvPr id="105" name="Rectangle 104"/>
@@ -5548,8 +5680,8 @@
               </p:sp>
             </mc:Fallback>
           </mc:AlternateContent>
-          <mc:AlternateContent xmlns:mc="http://schemas.openxmlformats.org/markup-compatibility/2006">
-            <mc:Choice xmlns:a14="http://schemas.microsoft.com/office/drawing/2010/main" Requires="a14">
+          <mc:AlternateContent xmlns:mc="http://schemas.openxmlformats.org/markup-compatibility/2006" xmlns:a14="http://schemas.microsoft.com/office/drawing/2010/main">
+            <mc:Choice Requires="a14">
               <p:sp>
                 <p:nvSpPr>
                   <p:cNvPr id="106" name="Rectangle 105"/>
@@ -5649,7 +5781,7 @@
                 </p:txBody>
               </p:sp>
             </mc:Choice>
-            <mc:Fallback>
+            <mc:Fallback xmlns="">
               <p:sp>
                 <p:nvSpPr>
                   <p:cNvPr id="106" name="Rectangle 105"/>

</xml_diff>